<commit_message>
KI hinzu und Überarbeitungen
</commit_message>
<xml_diff>
--- a/Bitcoin (und andere Kryptowährungen).pptx
+++ b/Bitcoin (und andere Kryptowährungen).pptx
@@ -4490,7 +4490,7 @@
           <a:p>
             <a:fld id="{ABFF243B-382F-47E1-A467-B90F6651F013}" type="datetimeFigureOut">
               <a:rPr lang="de-DE" smtClean="0"/>
-              <a:t>27.05.2024</a:t>
+              <a:t>30.05.2024</a:t>
             </a:fld>
             <a:endParaRPr lang="de-DE"/>
           </a:p>
@@ -4688,7 +4688,7 @@
           <a:p>
             <a:fld id="{ABFF243B-382F-47E1-A467-B90F6651F013}" type="datetimeFigureOut">
               <a:rPr lang="de-DE" smtClean="0"/>
-              <a:t>27.05.2024</a:t>
+              <a:t>30.05.2024</a:t>
             </a:fld>
             <a:endParaRPr lang="de-DE"/>
           </a:p>
@@ -4896,7 +4896,7 @@
           <a:p>
             <a:fld id="{ABFF243B-382F-47E1-A467-B90F6651F013}" type="datetimeFigureOut">
               <a:rPr lang="de-DE" smtClean="0"/>
-              <a:t>27.05.2024</a:t>
+              <a:t>30.05.2024</a:t>
             </a:fld>
             <a:endParaRPr lang="de-DE"/>
           </a:p>
@@ -5112,7 +5112,7 @@
           <a:p>
             <a:fld id="{ABFF243B-382F-47E1-A467-B90F6651F013}" type="datetimeFigureOut">
               <a:rPr lang="de-DE" smtClean="0"/>
-              <a:t>27.05.2024</a:t>
+              <a:t>30.05.2024</a:t>
             </a:fld>
             <a:endParaRPr lang="de-DE"/>
           </a:p>
@@ -5464,7 +5464,7 @@
           <a:p>
             <a:fld id="{ABFF243B-382F-47E1-A467-B90F6651F013}" type="datetimeFigureOut">
               <a:rPr lang="de-DE" smtClean="0"/>
-              <a:t>27.05.2024</a:t>
+              <a:t>30.05.2024</a:t>
             </a:fld>
             <a:endParaRPr lang="de-DE"/>
           </a:p>
@@ -5729,7 +5729,7 @@
           <a:p>
             <a:fld id="{ABFF243B-382F-47E1-A467-B90F6651F013}" type="datetimeFigureOut">
               <a:rPr lang="de-DE" smtClean="0"/>
-              <a:t>27.05.2024</a:t>
+              <a:t>30.05.2024</a:t>
             </a:fld>
             <a:endParaRPr lang="de-DE"/>
           </a:p>
@@ -6141,7 +6141,7 @@
           <a:p>
             <a:fld id="{ABFF243B-382F-47E1-A467-B90F6651F013}" type="datetimeFigureOut">
               <a:rPr lang="de-DE" smtClean="0"/>
-              <a:t>27.05.2024</a:t>
+              <a:t>30.05.2024</a:t>
             </a:fld>
             <a:endParaRPr lang="de-DE"/>
           </a:p>
@@ -6282,7 +6282,7 @@
           <a:p>
             <a:fld id="{ABFF243B-382F-47E1-A467-B90F6651F013}" type="datetimeFigureOut">
               <a:rPr lang="de-DE" smtClean="0"/>
-              <a:t>27.05.2024</a:t>
+              <a:t>30.05.2024</a:t>
             </a:fld>
             <a:endParaRPr lang="de-DE"/>
           </a:p>
@@ -6395,7 +6395,7 @@
           <a:p>
             <a:fld id="{ABFF243B-382F-47E1-A467-B90F6651F013}" type="datetimeFigureOut">
               <a:rPr lang="de-DE" smtClean="0"/>
-              <a:t>27.05.2024</a:t>
+              <a:t>30.05.2024</a:t>
             </a:fld>
             <a:endParaRPr lang="de-DE"/>
           </a:p>
@@ -6706,7 +6706,7 @@
           <a:p>
             <a:fld id="{ABFF243B-382F-47E1-A467-B90F6651F013}" type="datetimeFigureOut">
               <a:rPr lang="de-DE" smtClean="0"/>
-              <a:t>27.05.2024</a:t>
+              <a:t>30.05.2024</a:t>
             </a:fld>
             <a:endParaRPr lang="de-DE"/>
           </a:p>
@@ -6994,7 +6994,7 @@
           <a:p>
             <a:fld id="{ABFF243B-382F-47E1-A467-B90F6651F013}" type="datetimeFigureOut">
               <a:rPr lang="de-DE" smtClean="0"/>
-              <a:t>27.05.2024</a:t>
+              <a:t>30.05.2024</a:t>
             </a:fld>
             <a:endParaRPr lang="de-DE"/>
           </a:p>
@@ -7235,7 +7235,7 @@
           <a:p>
             <a:fld id="{ABFF243B-382F-47E1-A467-B90F6651F013}" type="datetimeFigureOut">
               <a:rPr lang="de-DE" smtClean="0"/>
-              <a:t>27.05.2024</a:t>
+              <a:t>30.05.2024</a:t>
             </a:fld>
             <a:endParaRPr lang="de-DE"/>
           </a:p>
@@ -9145,7 +9145,7 @@
             </a:pPr>
             <a:r>
               <a:rPr lang="de-DE" dirty="0"/>
-              <a:t>Die klassische "Bitcoin Core"-Wallet lädt zur sicheren Verifikation der Transaktionen die komplette Blockchain (ab 2009) herunter, z.Zt. &gt;350GB.</a:t>
+              <a:t>Die klassische "Bitcoin Core"-Wallet lädt zur sicheren Verifikation der Transaktionen die komplette Blockchain (ab 2009) herunter, z.Zt. &gt;600GB.</a:t>
             </a:r>
           </a:p>
           <a:p>
@@ -9230,15 +9230,7 @@
             </a:pPr>
             <a:r>
               <a:rPr lang="de-DE" dirty="0"/>
-              <a:t>Relativ neu sind Hardware </a:t>
-            </a:r>
-            <a:r>
-              <a:rPr lang="de-DE" dirty="0" err="1"/>
-              <a:t>Wallets</a:t>
-            </a:r>
-            <a:r>
-              <a:rPr lang="de-DE" dirty="0"/>
-              <a:t>: "Ledger Nano S", </a:t>
+              <a:t>Relativ neu sind Hardware Wallets: "Ledger Nano", </a:t>
             </a:r>
             <a:br>
               <a:rPr lang="de-DE" dirty="0"/>
@@ -9295,8 +9287,8 @@
         </p:blipFill>
         <p:spPr bwMode="auto">
           <a:xfrm>
-            <a:off x="6641529" y="621580"/>
-            <a:ext cx="5550471" cy="3396343"/>
+            <a:off x="7117307" y="1"/>
+            <a:ext cx="5074690" cy="3105212"/>
           </a:xfrm>
           <a:prstGeom prst="rect">
             <a:avLst/>
@@ -9327,7 +9319,7 @@
         </p:nvSpPr>
         <p:spPr>
           <a:xfrm>
-            <a:off x="8882609" y="3275111"/>
+            <a:off x="9053649" y="2560627"/>
             <a:ext cx="1068306" cy="307777"/>
           </a:xfrm>
           <a:prstGeom prst="rect">
@@ -9342,7 +9334,7 @@
           <a:lstStyle/>
           <a:p>
             <a:r>
-              <a:rPr lang="de-DE" sz="1400">
+              <a:rPr lang="de-DE" sz="1400" dirty="0">
                 <a:solidFill>
                   <a:srgbClr val="FF0000"/>
                 </a:solidFill>
@@ -9381,8 +9373,8 @@
         </p:blipFill>
         <p:spPr bwMode="auto">
           <a:xfrm>
-            <a:off x="6641527" y="4017923"/>
-            <a:ext cx="5550471" cy="2840077"/>
+            <a:off x="7117306" y="3105213"/>
+            <a:ext cx="5074691" cy="2596629"/>
           </a:xfrm>
           <a:prstGeom prst="rect">
             <a:avLst/>
@@ -9413,7 +9405,7 @@
         </p:nvSpPr>
         <p:spPr>
           <a:xfrm>
-            <a:off x="9001881" y="5551186"/>
+            <a:off x="9186126" y="5121282"/>
             <a:ext cx="840295" cy="307777"/>
           </a:xfrm>
           <a:prstGeom prst="rect">
@@ -9428,12 +9420,81 @@
           <a:lstStyle/>
           <a:p>
             <a:r>
-              <a:rPr lang="de-DE" sz="1400">
+              <a:rPr lang="de-DE" sz="1400" dirty="0">
                 <a:solidFill>
                   <a:srgbClr val="FF0000"/>
                 </a:solidFill>
               </a:rPr>
               <a:t>Electrum</a:t>
+            </a:r>
+          </a:p>
+        </p:txBody>
+      </p:sp>
+      <p:pic>
+        <p:nvPicPr>
+          <p:cNvPr id="5" name="Grafik 4">
+            <a:extLst>
+              <a:ext uri="{FF2B5EF4-FFF2-40B4-BE49-F238E27FC236}">
+                <a16:creationId xmlns:a16="http://schemas.microsoft.com/office/drawing/2014/main" id="{FD44B8B1-F1EB-04D8-A665-F3CF0E492908}"/>
+              </a:ext>
+            </a:extLst>
+          </p:cNvPr>
+          <p:cNvPicPr>
+            <a:picLocks noChangeAspect="1"/>
+          </p:cNvPicPr>
+          <p:nvPr/>
+        </p:nvPicPr>
+        <p:blipFill>
+          <a:blip r:embed="rId4"/>
+          <a:stretch>
+            <a:fillRect/>
+          </a:stretch>
+        </p:blipFill>
+        <p:spPr>
+          <a:xfrm>
+            <a:off x="8124555" y="5743479"/>
+            <a:ext cx="2236251" cy="1058725"/>
+          </a:xfrm>
+          <a:prstGeom prst="rect">
+            <a:avLst/>
+          </a:prstGeom>
+        </p:spPr>
+      </p:pic>
+      <p:sp>
+        <p:nvSpPr>
+          <p:cNvPr id="7" name="Textfeld 6">
+            <a:extLst>
+              <a:ext uri="{FF2B5EF4-FFF2-40B4-BE49-F238E27FC236}">
+                <a16:creationId xmlns:a16="http://schemas.microsoft.com/office/drawing/2014/main" id="{5700BE03-FDEF-5244-1154-5751ED02732B}"/>
+              </a:ext>
+            </a:extLst>
+          </p:cNvPr>
+          <p:cNvSpPr txBox="1"/>
+          <p:nvPr/>
+        </p:nvSpPr>
+        <p:spPr>
+          <a:xfrm>
+            <a:off x="9470756" y="6408424"/>
+            <a:ext cx="1111330" cy="307777"/>
+          </a:xfrm>
+          <a:prstGeom prst="rect">
+            <a:avLst/>
+          </a:prstGeom>
+          <a:noFill/>
+        </p:spPr>
+        <p:txBody>
+          <a:bodyPr wrap="none" rtlCol="0">
+            <a:spAutoFit/>
+          </a:bodyPr>
+          <a:lstStyle/>
+          <a:p>
+            <a:r>
+              <a:rPr lang="de-DE" sz="1400" dirty="0">
+                <a:solidFill>
+                  <a:srgbClr val="FF0000"/>
+                </a:solidFill>
+              </a:rPr>
+              <a:t>Ledger Nano</a:t>
             </a:r>
           </a:p>
         </p:txBody>
@@ -12903,15 +12964,11 @@
             </a:r>
             <a:r>
               <a:rPr lang="de-DE" dirty="0"/>
-              <a:t> von 6.25 neuen(!) Bitcoin als Belohnung, diese baut er als erste Transaktion in den Block ein ("</a:t>
-            </a:r>
-            <a:r>
-              <a:rPr lang="de-DE" b="1" dirty="0" err="1"/>
-              <a:t>Coinbase</a:t>
+              <a:t> von 3.125 neuen(!) Bitcoin als Belohnung, diese baut er als erste Transaktion in den Block ein ("</a:t>
             </a:r>
             <a:r>
               <a:rPr lang="de-DE" b="1" dirty="0"/>
-              <a:t> Transaction</a:t>
+              <a:t>Coinbase Transaction</a:t>
             </a:r>
             <a:r>
               <a:rPr lang="de-DE" dirty="0"/>

</xml_diff>